<commit_message>
acpt: add scenarios for picture pos and size
</commit_message>
<xml_diff>
--- a/features/steps/test_files/shp-pos-and-size.pptx
+++ b/features/steps/test_files/shp-pos-and-size.pptx
@@ -6,6 +6,7 @@
   </p:sldMasterIdLst>
   <p:sldIdLst>
     <p:sldId id="256" r:id="rId2"/>
+    <p:sldId id="257" r:id="rId3"/>
   </p:sldIdLst>
   <p:sldSz cx="9144000" cy="6858000" type="screen4x3"/>
   <p:notesSz cx="6858000" cy="9144000"/>
@@ -501,6 +502,66 @@
     <p:extLst>
       <p:ext uri="{BB962C8B-B14F-4D97-AF65-F5344CB8AC3E}">
         <p14:creationId xmlns:p14="http://schemas.microsoft.com/office/powerpoint/2010/main" val="3664683099"/>
+      </p:ext>
+    </p:extLst>
+  </p:cSld>
+  <p:clrMapOvr>
+    <a:masterClrMapping/>
+  </p:clrMapOvr>
+</p:sld>
+</file>
+
+<file path=ppt/slides/slide2.xml><?xml version="1.0" encoding="utf-8"?>
+<p:sld xmlns:a="http://schemas.openxmlformats.org/drawingml/2006/main" xmlns:r="http://schemas.openxmlformats.org/officeDocument/2006/relationships" xmlns:p="http://schemas.openxmlformats.org/presentationml/2006/main">
+  <p:cSld>
+    <p:spTree>
+      <p:nvGrpSpPr>
+        <p:cNvPr id="1" name=""/>
+        <p:cNvGrpSpPr/>
+        <p:nvPr/>
+      </p:nvGrpSpPr>
+      <p:grpSpPr>
+        <a:xfrm>
+          <a:off x="0" y="0"/>
+          <a:ext cx="0" cy="0"/>
+          <a:chOff x="0" y="0"/>
+          <a:chExt cx="0" cy="0"/>
+        </a:xfrm>
+      </p:grpSpPr>
+      <p:pic>
+        <p:nvPicPr>
+          <p:cNvPr id="2" name="Picture 1" descr="monty-truth.png"/>
+          <p:cNvPicPr>
+            <a:picLocks/>
+          </p:cNvPicPr>
+          <p:nvPr/>
+        </p:nvPicPr>
+        <p:blipFill>
+          <a:blip r:embed="rId2">
+            <a:extLst>
+              <a:ext uri="{28A0092B-C50C-407E-A947-70E740481C1C}">
+                <a14:useLocalDpi xmlns:a14="http://schemas.microsoft.com/office/drawing/2010/main" val="0"/>
+              </a:ext>
+            </a:extLst>
+          </a:blip>
+          <a:stretch>
+            <a:fillRect/>
+          </a:stretch>
+        </p:blipFill>
+        <p:spPr>
+          <a:xfrm>
+            <a:off x="914400" y="1828800"/>
+            <a:ext cx="2743200" cy="3657600"/>
+          </a:xfrm>
+          <a:prstGeom prst="rect">
+            <a:avLst/>
+          </a:prstGeom>
+        </p:spPr>
+      </p:pic>
+    </p:spTree>
+    <p:extLst>
+      <p:ext uri="{BB962C8B-B14F-4D97-AF65-F5344CB8AC3E}">
+        <p14:creationId xmlns:p14="http://schemas.microsoft.com/office/powerpoint/2010/main" val="1100317646"/>
       </p:ext>
     </p:extLst>
   </p:cSld>

</xml_diff>

<commit_message>
acpt: add shp-pos-and-size scenario for table
</commit_message>
<xml_diff>
--- a/features/steps/test_files/shp-pos-and-size.pptx
+++ b/features/steps/test_files/shp-pos-and-size.pptx
@@ -7,6 +7,7 @@
   <p:sldIdLst>
     <p:sldId id="256" r:id="rId2"/>
     <p:sldId id="257" r:id="rId3"/>
+    <p:sldId id="258" r:id="rId4"/>
   </p:sldIdLst>
   <p:sldSz cx="9144000" cy="6858000" type="screen4x3"/>
   <p:notesSz cx="6858000" cy="9144000"/>
@@ -571,6 +572,106 @@
 </p:sld>
 </file>
 
+<file path=ppt/slides/slide3.xml><?xml version="1.0" encoding="utf-8"?>
+<p:sld xmlns:a="http://schemas.openxmlformats.org/drawingml/2006/main" xmlns:r="http://schemas.openxmlformats.org/officeDocument/2006/relationships" xmlns:p="http://schemas.openxmlformats.org/presentationml/2006/main">
+  <p:cSld>
+    <p:spTree>
+      <p:nvGrpSpPr>
+        <p:cNvPr id="1" name=""/>
+        <p:cNvGrpSpPr/>
+        <p:nvPr/>
+      </p:nvGrpSpPr>
+      <p:grpSpPr>
+        <a:xfrm>
+          <a:off x="0" y="0"/>
+          <a:ext cx="0" cy="0"/>
+          <a:chOff x="0" y="0"/>
+          <a:chExt cx="0" cy="0"/>
+        </a:xfrm>
+      </p:grpSpPr>
+      <p:graphicFrame>
+        <p:nvGraphicFramePr>
+          <p:cNvPr id="2" name="Table 1"/>
+          <p:cNvGraphicFramePr>
+            <a:graphicFrameLocks noGrp="1"/>
+          </p:cNvGraphicFramePr>
+          <p:nvPr/>
+        </p:nvGraphicFramePr>
+        <p:xfrm>
+          <a:off x="1524000" y="1397000"/>
+          <a:ext cx="6096000" cy="741680"/>
+        </p:xfrm>
+        <a:graphic>
+          <a:graphicData uri="http://schemas.openxmlformats.org/drawingml/2006/table">
+            <a:tbl>
+              <a:tblPr firstRow="1" bandRow="1">
+                <a:tableStyleId>{5C22544A-7EE6-4342-B048-85BDC9FD1C3A}</a:tableStyleId>
+              </a:tblPr>
+              <a:tblGrid>
+                <a:gridCol w="3048000"/>
+                <a:gridCol w="3048000"/>
+              </a:tblGrid>
+              <a:tr h="370840">
+                <a:tc>
+                  <a:txBody>
+                    <a:bodyPr/>
+                    <a:lstStyle/>
+                    <a:p>
+                      <a:endParaRPr lang="en-US" dirty="0"/>
+                    </a:p>
+                  </a:txBody>
+                  <a:tcPr/>
+                </a:tc>
+                <a:tc>
+                  <a:txBody>
+                    <a:bodyPr/>
+                    <a:lstStyle/>
+                    <a:p>
+                      <a:endParaRPr lang="en-US"/>
+                    </a:p>
+                  </a:txBody>
+                  <a:tcPr/>
+                </a:tc>
+              </a:tr>
+              <a:tr h="370840">
+                <a:tc>
+                  <a:txBody>
+                    <a:bodyPr/>
+                    <a:lstStyle/>
+                    <a:p>
+                      <a:endParaRPr lang="en-US"/>
+                    </a:p>
+                  </a:txBody>
+                  <a:tcPr/>
+                </a:tc>
+                <a:tc>
+                  <a:txBody>
+                    <a:bodyPr/>
+                    <a:lstStyle/>
+                    <a:p>
+                      <a:endParaRPr lang="en-US"/>
+                    </a:p>
+                  </a:txBody>
+                  <a:tcPr/>
+                </a:tc>
+              </a:tr>
+            </a:tbl>
+          </a:graphicData>
+        </a:graphic>
+      </p:graphicFrame>
+    </p:spTree>
+    <p:extLst>
+      <p:ext uri="{BB962C8B-B14F-4D97-AF65-F5344CB8AC3E}">
+        <p14:creationId xmlns:p14="http://schemas.microsoft.com/office/powerpoint/2010/main" val="154463647"/>
+      </p:ext>
+    </p:extLst>
+  </p:cSld>
+  <p:clrMapOvr>
+    <a:masterClrMapping/>
+  </p:clrMapOvr>
+</p:sld>
+</file>
+
 <file path=ppt/theme/theme1.xml><?xml version="1.0" encoding="utf-8"?>
 <a:theme xmlns:a="http://schemas.openxmlformats.org/drawingml/2006/main" name="Office Theme">
   <a:themeElements>

</xml_diff>